<commit_message>
Links graficas en PPT
</commit_message>
<xml_diff>
--- a/Proyecto 1/PresentacionProyecto1.pptx
+++ b/Proyecto 1/PresentacionProyecto1.pptx
@@ -11,6 +11,7 @@
     <p:sldId id="265" r:id="rId5"/>
     <p:sldId id="267" r:id="rId6"/>
     <p:sldId id="266" r:id="rId7"/>
+    <p:sldId id="269" r:id="rId8"/>
   </p:sldIdLst>
   <p:sldSz cx="12192000" cy="6858000"/>
   <p:notesSz cx="6858000" cy="9144000"/>
@@ -303,7 +304,7 @@
             <a:fld id="{D57F1E4F-1CFF-5643-939E-217C01CDF565}" type="slidenum">
               <a:rPr lang="en-US" smtClean="0"/>
               <a:pPr/>
-              <a:t>‹#›</a:t>
+              <a:t>‹Nº›</a:t>
             </a:fld>
             <a:endParaRPr lang="en-US" dirty="0"/>
           </a:p>
@@ -475,7 +476,7 @@
             <a:fld id="{D57F1E4F-1CFF-5643-939E-217C01CDF565}" type="slidenum">
               <a:rPr lang="en-US" smtClean="0"/>
               <a:pPr/>
-              <a:t>‹#›</a:t>
+              <a:t>‹Nº›</a:t>
             </a:fld>
             <a:endParaRPr lang="en-US" dirty="0"/>
           </a:p>
@@ -657,7 +658,7 @@
             <a:fld id="{D57F1E4F-1CFF-5643-939E-217C01CDF565}" type="slidenum">
               <a:rPr lang="en-US" smtClean="0"/>
               <a:pPr/>
-              <a:t>‹#›</a:t>
+              <a:t>‹Nº›</a:t>
             </a:fld>
             <a:endParaRPr lang="en-US" dirty="0"/>
           </a:p>
@@ -1227,7 +1228,7 @@
             <a:fld id="{D57F1E4F-1CFF-5643-939E-217C01CDF565}" type="slidenum">
               <a:rPr lang="en-US" smtClean="0"/>
               <a:pPr/>
-              <a:t>‹#›</a:t>
+              <a:t>‹Nº›</a:t>
             </a:fld>
             <a:endParaRPr lang="en-US" dirty="0"/>
           </a:p>
@@ -1404,7 +1405,7 @@
             <a:fld id="{D57F1E4F-1CFF-5643-939E-217C01CDF565}" type="slidenum">
               <a:rPr lang="en-US" smtClean="0"/>
               <a:pPr/>
-              <a:t>‹#›</a:t>
+              <a:t>‹Nº›</a:t>
             </a:fld>
             <a:endParaRPr lang="en-US" dirty="0"/>
           </a:p>
@@ -1652,7 +1653,7 @@
             <a:fld id="{D57F1E4F-1CFF-5643-939E-217C01CDF565}" type="slidenum">
               <a:rPr lang="en-US" smtClean="0"/>
               <a:pPr/>
-              <a:t>‹#›</a:t>
+              <a:t>‹Nº›</a:t>
             </a:fld>
             <a:endParaRPr lang="en-US" dirty="0"/>
           </a:p>
@@ -1951,7 +1952,7 @@
             <a:fld id="{D57F1E4F-1CFF-5643-939E-217C01CDF565}" type="slidenum">
               <a:rPr lang="en-US" smtClean="0"/>
               <a:pPr/>
-              <a:t>‹#›</a:t>
+              <a:t>‹Nº›</a:t>
             </a:fld>
             <a:endParaRPr lang="en-US" dirty="0"/>
           </a:p>
@@ -2395,7 +2396,7 @@
             <a:fld id="{D57F1E4F-1CFF-5643-939E-217C01CDF565}" type="slidenum">
               <a:rPr lang="en-US" smtClean="0"/>
               <a:pPr/>
-              <a:t>‹#›</a:t>
+              <a:t>‹Nº›</a:t>
             </a:fld>
             <a:endParaRPr lang="en-US" dirty="0"/>
           </a:p>
@@ -2515,7 +2516,7 @@
             <a:fld id="{D57F1E4F-1CFF-5643-939E-217C01CDF565}" type="slidenum">
               <a:rPr lang="en-US" smtClean="0"/>
               <a:pPr/>
-              <a:t>‹#›</a:t>
+              <a:t>‹Nº›</a:t>
             </a:fld>
             <a:endParaRPr lang="en-US" dirty="0"/>
           </a:p>
@@ -2612,7 +2613,7 @@
             <a:fld id="{D57F1E4F-1CFF-5643-939E-217C01CDF565}" type="slidenum">
               <a:rPr lang="en-US" smtClean="0"/>
               <a:pPr/>
-              <a:t>‹#›</a:t>
+              <a:t>‹Nº›</a:t>
             </a:fld>
             <a:endParaRPr lang="en-US" dirty="0"/>
           </a:p>
@@ -2897,7 +2898,7 @@
             <a:fld id="{D57F1E4F-1CFF-5643-939E-217C01CDF565}" type="slidenum">
               <a:rPr lang="en-US" smtClean="0"/>
               <a:pPr/>
-              <a:t>‹#›</a:t>
+              <a:t>‹Nº›</a:t>
             </a:fld>
             <a:endParaRPr lang="en-US" dirty="0"/>
           </a:p>
@@ -3069,7 +3070,7 @@
             <a:fld id="{D57F1E4F-1CFF-5643-939E-217C01CDF565}" type="slidenum">
               <a:rPr lang="en-US" smtClean="0"/>
               <a:pPr/>
-              <a:t>‹#›</a:t>
+              <a:t>‹Nº›</a:t>
             </a:fld>
             <a:endParaRPr lang="en-US" dirty="0"/>
           </a:p>
@@ -3362,7 +3363,7 @@
             <a:fld id="{D57F1E4F-1CFF-5643-939E-217C01CDF565}" type="slidenum">
               <a:rPr lang="en-US" smtClean="0"/>
               <a:pPr/>
-              <a:t>‹#›</a:t>
+              <a:t>‹Nº›</a:t>
             </a:fld>
             <a:endParaRPr lang="en-US" dirty="0"/>
           </a:p>
@@ -3655,7 +3656,7 @@
             <a:fld id="{D57F1E4F-1CFF-5643-939E-217C01CDF565}" type="slidenum">
               <a:rPr lang="en-US" smtClean="0"/>
               <a:pPr/>
-              <a:t>‹#›</a:t>
+              <a:t>‹Nº›</a:t>
             </a:fld>
             <a:endParaRPr lang="en-US" dirty="0"/>
           </a:p>
@@ -3905,7 +3906,7 @@
             <a:fld id="{D57F1E4F-1CFF-5643-939E-217C01CDF565}" type="slidenum">
               <a:rPr lang="en-US" smtClean="0"/>
               <a:pPr/>
-              <a:t>‹#›</a:t>
+              <a:t>‹Nº›</a:t>
             </a:fld>
             <a:endParaRPr lang="en-US" dirty="0"/>
           </a:p>
@@ -4447,7 +4448,7 @@
             <a:fld id="{D57F1E4F-1CFF-5643-939E-217C01CDF565}" type="slidenum">
               <a:rPr lang="en-US" smtClean="0"/>
               <a:pPr/>
-              <a:t>‹#›</a:t>
+              <a:t>‹Nº›</a:t>
             </a:fld>
             <a:endParaRPr lang="en-US" dirty="0"/>
           </a:p>
@@ -4697,7 +4698,7 @@
             <a:fld id="{D57F1E4F-1CFF-5643-939E-217C01CDF565}" type="slidenum">
               <a:rPr lang="en-US" smtClean="0"/>
               <a:pPr/>
-              <a:t>‹#›</a:t>
+              <a:t>‹Nº›</a:t>
             </a:fld>
             <a:endParaRPr lang="en-US" dirty="0"/>
           </a:p>
@@ -5231,7 +5232,7 @@
             <a:fld id="{D57F1E4F-1CFF-5643-939E-217C01CDF565}" type="slidenum">
               <a:rPr lang="en-US" smtClean="0"/>
               <a:pPr/>
-              <a:t>‹#›</a:t>
+              <a:t>‹Nº›</a:t>
             </a:fld>
             <a:endParaRPr lang="en-US" dirty="0"/>
           </a:p>
@@ -5530,7 +5531,7 @@
             <a:fld id="{D57F1E4F-1CFF-5643-939E-217C01CDF565}" type="slidenum">
               <a:rPr lang="en-US" smtClean="0"/>
               <a:pPr/>
-              <a:t>‹#›</a:t>
+              <a:t>‹Nº›</a:t>
             </a:fld>
             <a:endParaRPr lang="en-US" dirty="0"/>
           </a:p>
@@ -5706,7 +5707,7 @@
             <a:fld id="{D57F1E4F-1CFF-5643-939E-217C01CDF565}" type="slidenum">
               <a:rPr lang="en-US" smtClean="0"/>
               <a:pPr/>
-              <a:t>‹#›</a:t>
+              <a:t>‹Nº›</a:t>
             </a:fld>
             <a:endParaRPr lang="en-US" dirty="0"/>
           </a:p>
@@ -5888,7 +5889,7 @@
             <a:fld id="{D57F1E4F-1CFF-5643-939E-217C01CDF565}" type="slidenum">
               <a:rPr lang="en-US" smtClean="0"/>
               <a:pPr/>
-              <a:t>‹#›</a:t>
+              <a:t>‹Nº›</a:t>
             </a:fld>
             <a:endParaRPr lang="en-US" dirty="0"/>
           </a:p>
@@ -6141,7 +6142,7 @@
             <a:fld id="{D57F1E4F-1CFF-5643-939E-217C01CDF565}" type="slidenum">
               <a:rPr lang="en-US" smtClean="0"/>
               <a:pPr/>
-              <a:t>‹#›</a:t>
+              <a:t>‹Nº›</a:t>
             </a:fld>
             <a:endParaRPr lang="en-US" dirty="0"/>
           </a:p>
@@ -6375,7 +6376,7 @@
             <a:fld id="{D57F1E4F-1CFF-5643-939E-217C01CDF565}" type="slidenum">
               <a:rPr lang="en-US" smtClean="0"/>
               <a:pPr/>
-              <a:t>‹#›</a:t>
+              <a:t>‹Nº›</a:t>
             </a:fld>
             <a:endParaRPr lang="en-US" dirty="0"/>
           </a:p>
@@ -6724,7 +6725,7 @@
             <a:fld id="{D57F1E4F-1CFF-5643-939E-217C01CDF565}" type="slidenum">
               <a:rPr lang="en-US" smtClean="0"/>
               <a:pPr/>
-              <a:t>‹#›</a:t>
+              <a:t>‹Nº›</a:t>
             </a:fld>
             <a:endParaRPr lang="en-US" dirty="0"/>
           </a:p>
@@ -6844,7 +6845,7 @@
             <a:fld id="{D57F1E4F-1CFF-5643-939E-217C01CDF565}" type="slidenum">
               <a:rPr lang="en-US" smtClean="0"/>
               <a:pPr/>
-              <a:t>‹#›</a:t>
+              <a:t>‹Nº›</a:t>
             </a:fld>
             <a:endParaRPr lang="en-US" dirty="0"/>
           </a:p>
@@ -6964,7 +6965,7 @@
             <a:fld id="{D57F1E4F-1CFF-5643-939E-217C01CDF565}" type="slidenum">
               <a:rPr lang="en-US" smtClean="0"/>
               <a:pPr/>
-              <a:t>‹#›</a:t>
+              <a:t>‹Nº›</a:t>
             </a:fld>
             <a:endParaRPr lang="en-US" dirty="0"/>
           </a:p>
@@ -7250,7 +7251,7 @@
             <a:fld id="{D57F1E4F-1CFF-5643-939E-217C01CDF565}" type="slidenum">
               <a:rPr lang="en-US" smtClean="0"/>
               <a:pPr/>
-              <a:t>‹#›</a:t>
+              <a:t>‹Nº›</a:t>
             </a:fld>
             <a:endParaRPr lang="en-US" dirty="0"/>
           </a:p>
@@ -7516,7 +7517,7 @@
             <a:fld id="{D57F1E4F-1CFF-5643-939E-217C01CDF565}" type="slidenum">
               <a:rPr lang="en-US" smtClean="0"/>
               <a:pPr/>
-              <a:t>‹#›</a:t>
+              <a:t>‹Nº›</a:t>
             </a:fld>
             <a:endParaRPr lang="en-US" dirty="0"/>
           </a:p>
@@ -7769,7 +7770,7 @@
             <a:fld id="{D57F1E4F-1CFF-5643-939E-217C01CDF565}" type="slidenum">
               <a:rPr lang="en-US" smtClean="0"/>
               <a:pPr/>
-              <a:t>‹#›</a:t>
+              <a:t>‹Nº›</a:t>
             </a:fld>
             <a:endParaRPr lang="en-US" dirty="0"/>
           </a:p>
@@ -8616,7 +8617,7 @@
             <a:fld id="{D57F1E4F-1CFF-5643-939E-217C01CDF565}" type="slidenum">
               <a:rPr lang="en-US" smtClean="0"/>
               <a:pPr/>
-              <a:t>‹#›</a:t>
+              <a:t>‹Nº›</a:t>
             </a:fld>
             <a:endParaRPr lang="en-US" dirty="0"/>
           </a:p>
@@ -9095,7 +9096,7 @@
                 <a16:creationId xmlns:a16="http://schemas.microsoft.com/office/drawing/2014/main" id="{CE3D4922-3D1C-4679-9A86-15BFC1A252F0}"/>
               </a:ext>
               <a:ext uri="{C183D7F6-B498-43B3-948B-1728B52AA6E4}">
-                <adec:decorative xmlns:adec="http://schemas.microsoft.com/office/drawing/2017/decorative" val="1"/>
+                <adec:decorative xmlns:adec="http://schemas.microsoft.com/office/drawing/2017/decorative" xmlns="" val="1"/>
               </a:ext>
             </a:extLst>
           </p:cNvPr>
@@ -9155,7 +9156,7 @@
                 <a16:creationId xmlns:a16="http://schemas.microsoft.com/office/drawing/2014/main" id="{164E9BCF-1B67-4514-808C-A5DCBDEB4A85}"/>
               </a:ext>
               <a:ext uri="{C183D7F6-B498-43B3-948B-1728B52AA6E4}">
-                <adec:decorative xmlns:adec="http://schemas.microsoft.com/office/drawing/2017/decorative" val="1"/>
+                <adec:decorative xmlns:adec="http://schemas.microsoft.com/office/drawing/2017/decorative" xmlns="" val="1"/>
               </a:ext>
             </a:extLst>
           </p:cNvPr>
@@ -9338,7 +9339,7 @@
                 <a16:creationId xmlns:a16="http://schemas.microsoft.com/office/drawing/2014/main" id="{32238778-9D1D-45F4-BB78-76F208A224B4}"/>
               </a:ext>
               <a:ext uri="{C183D7F6-B498-43B3-948B-1728B52AA6E4}">
-                <adec:decorative xmlns:adec="http://schemas.microsoft.com/office/drawing/2017/decorative" val="1"/>
+                <adec:decorative xmlns:adec="http://schemas.microsoft.com/office/drawing/2017/decorative" xmlns="" val="1"/>
               </a:ext>
             </a:extLst>
           </p:cNvPr>
@@ -9369,7 +9370,7 @@
                   <a16:creationId xmlns:a16="http://schemas.microsoft.com/office/drawing/2014/main" id="{93667F4D-F2CD-4E50-BACC-24766910F77C}"/>
                 </a:ext>
                 <a:ext uri="{C183D7F6-B498-43B3-948B-1728B52AA6E4}">
-                  <adec:decorative xmlns:adec="http://schemas.microsoft.com/office/drawing/2017/decorative" val="1"/>
+                  <adec:decorative xmlns:adec="http://schemas.microsoft.com/office/drawing/2017/decorative" xmlns="" val="1"/>
                 </a:ext>
               </a:extLst>
             </p:cNvPr>
@@ -9430,7 +9431,7 @@
                   <a16:creationId xmlns:a16="http://schemas.microsoft.com/office/drawing/2014/main" id="{20CAAE25-D2F2-493F-9569-EC552C1ADD70}"/>
                 </a:ext>
                 <a:ext uri="{C183D7F6-B498-43B3-948B-1728B52AA6E4}">
-                  <adec:decorative xmlns:adec="http://schemas.microsoft.com/office/drawing/2017/decorative" val="1"/>
+                  <adec:decorative xmlns:adec="http://schemas.microsoft.com/office/drawing/2017/decorative" xmlns="" val="1"/>
                 </a:ext>
               </a:extLst>
             </p:cNvPr>
@@ -9494,7 +9495,7 @@
                   <a16:creationId xmlns:a16="http://schemas.microsoft.com/office/drawing/2014/main" id="{42D5E996-541D-42BA-8B22-F7E96752CE34}"/>
                 </a:ext>
                 <a:ext uri="{C183D7F6-B498-43B3-948B-1728B52AA6E4}">
-                  <adec:decorative xmlns:adec="http://schemas.microsoft.com/office/drawing/2017/decorative" val="1"/>
+                  <adec:decorative xmlns:adec="http://schemas.microsoft.com/office/drawing/2017/decorative" xmlns="" val="1"/>
                 </a:ext>
               </a:extLst>
             </p:cNvPr>
@@ -9555,7 +9556,7 @@
                   <a16:creationId xmlns:a16="http://schemas.microsoft.com/office/drawing/2014/main" id="{6BDB86F1-7C07-4D49-B9C9-7837A1FB2551}"/>
                 </a:ext>
                 <a:ext uri="{C183D7F6-B498-43B3-948B-1728B52AA6E4}">
-                  <adec:decorative xmlns:adec="http://schemas.microsoft.com/office/drawing/2017/decorative" val="1"/>
+                  <adec:decorative xmlns:adec="http://schemas.microsoft.com/office/drawing/2017/decorative" xmlns="" val="1"/>
                 </a:ext>
               </a:extLst>
             </p:cNvPr>
@@ -9615,7 +9616,7 @@
                   <a16:creationId xmlns:a16="http://schemas.microsoft.com/office/drawing/2014/main" id="{92FDEA97-0861-44C0-9B26-4BB5F777AE11}"/>
                 </a:ext>
                 <a:ext uri="{C183D7F6-B498-43B3-948B-1728B52AA6E4}">
-                  <adec:decorative xmlns:adec="http://schemas.microsoft.com/office/drawing/2017/decorative" val="1"/>
+                  <adec:decorative xmlns:adec="http://schemas.microsoft.com/office/drawing/2017/decorative" xmlns="" val="1"/>
                 </a:ext>
               </a:extLst>
             </p:cNvPr>
@@ -9681,7 +9682,7 @@
                   <a16:creationId xmlns:a16="http://schemas.microsoft.com/office/drawing/2014/main" id="{A9F3AA02-C861-444A-9178-0BD3D3CE16A1}"/>
                 </a:ext>
                 <a:ext uri="{C183D7F6-B498-43B3-948B-1728B52AA6E4}">
-                  <adec:decorative xmlns:adec="http://schemas.microsoft.com/office/drawing/2017/decorative" val="1"/>
+                  <adec:decorative xmlns:adec="http://schemas.microsoft.com/office/drawing/2017/decorative" xmlns="" val="1"/>
                 </a:ext>
               </a:extLst>
             </p:cNvPr>
@@ -14332,6 +14333,430 @@
     <p:extLst>
       <p:ext uri="{BB962C8B-B14F-4D97-AF65-F5344CB8AC3E}">
         <p14:creationId xmlns:p14="http://schemas.microsoft.com/office/powerpoint/2010/main" val="3387462765"/>
+      </p:ext>
+    </p:extLst>
+  </p:cSld>
+  <p:clrMapOvr>
+    <a:masterClrMapping/>
+  </p:clrMapOvr>
+</p:sld>
+</file>
+
+<file path=ppt/slides/slide6.xml><?xml version="1.0" encoding="utf-8"?>
+<p:sld xmlns:a="http://schemas.openxmlformats.org/drawingml/2006/main" xmlns:r="http://schemas.openxmlformats.org/officeDocument/2006/relationships" xmlns:p="http://schemas.openxmlformats.org/presentationml/2006/main">
+  <p:cSld>
+    <p:spTree>
+      <p:nvGrpSpPr>
+        <p:cNvPr id="1" name=""/>
+        <p:cNvGrpSpPr/>
+        <p:nvPr/>
+      </p:nvGrpSpPr>
+      <p:grpSpPr>
+        <a:xfrm>
+          <a:off x="0" y="0"/>
+          <a:ext cx="0" cy="0"/>
+          <a:chOff x="0" y="0"/>
+          <a:chExt cx="0" cy="0"/>
+        </a:xfrm>
+      </p:grpSpPr>
+      <p:sp>
+        <p:nvSpPr>
+          <p:cNvPr id="2" name="Título 1"/>
+          <p:cNvSpPr>
+            <a:spLocks noGrp="1"/>
+          </p:cNvSpPr>
+          <p:nvPr>
+            <p:ph type="title"/>
+          </p:nvPr>
+        </p:nvSpPr>
+        <p:spPr>
+          <a:xfrm>
+            <a:off x="1484309" y="223345"/>
+            <a:ext cx="10018713" cy="1058917"/>
+          </a:xfrm>
+        </p:spPr>
+        <p:txBody>
+          <a:bodyPr/>
+          <a:lstStyle/>
+          <a:p>
+            <a:r>
+              <a:rPr lang="es-MX" dirty="0" smtClean="0">
+                <a:latin typeface="Segoe UI" panose="020B0502040204020203" pitchFamily="34" charset="0"/>
+                <a:cs typeface="Segoe UI" panose="020B0502040204020203" pitchFamily="34" charset="0"/>
+              </a:rPr>
+              <a:t>Gráficas</a:t>
+            </a:r>
+            <a:endParaRPr lang="es-MX" dirty="0">
+              <a:latin typeface="Segoe UI" panose="020B0502040204020203" pitchFamily="34" charset="0"/>
+              <a:cs typeface="Segoe UI" panose="020B0502040204020203" pitchFamily="34" charset="0"/>
+            </a:endParaRPr>
+          </a:p>
+        </p:txBody>
+      </p:sp>
+      <p:sp>
+        <p:nvSpPr>
+          <p:cNvPr id="3" name="Marcador de contenido 2"/>
+          <p:cNvSpPr>
+            <a:spLocks noGrp="1"/>
+          </p:cNvSpPr>
+          <p:nvPr>
+            <p:ph idx="1"/>
+          </p:nvPr>
+        </p:nvSpPr>
+        <p:spPr>
+          <a:xfrm>
+            <a:off x="1960561" y="2428875"/>
+            <a:ext cx="3049590" cy="2000251"/>
+          </a:xfrm>
+        </p:spPr>
+        <p:txBody>
+          <a:bodyPr>
+            <a:noAutofit/>
+          </a:bodyPr>
+          <a:lstStyle/>
+          <a:p>
+            <a:r>
+              <a:rPr lang="es-MX" sz="3600" dirty="0" err="1" smtClean="0">
+                <a:latin typeface="Segoe UI" panose="020B0502040204020203" pitchFamily="34" charset="0"/>
+                <a:cs typeface="Segoe UI" panose="020B0502040204020203" pitchFamily="34" charset="0"/>
+                <a:hlinkClick r:id="rId2"/>
+              </a:rPr>
+              <a:t>Rosenbrock</a:t>
+            </a:r>
+            <a:endParaRPr lang="es-MX" sz="3600" dirty="0" smtClean="0">
+              <a:latin typeface="Segoe UI" panose="020B0502040204020203" pitchFamily="34" charset="0"/>
+              <a:cs typeface="Segoe UI" panose="020B0502040204020203" pitchFamily="34" charset="0"/>
+            </a:endParaRPr>
+          </a:p>
+          <a:p>
+            <a:r>
+              <a:rPr lang="es-MX" sz="3600" dirty="0" err="1" smtClean="0">
+                <a:latin typeface="Segoe UI" panose="020B0502040204020203" pitchFamily="34" charset="0"/>
+                <a:cs typeface="Segoe UI" panose="020B0502040204020203" pitchFamily="34" charset="0"/>
+                <a:hlinkClick r:id="rId3"/>
+              </a:rPr>
+              <a:t>Rastrigin</a:t>
+            </a:r>
+            <a:endParaRPr lang="es-MX" sz="3600" dirty="0" smtClean="0">
+              <a:latin typeface="Segoe UI" panose="020B0502040204020203" pitchFamily="34" charset="0"/>
+              <a:cs typeface="Segoe UI" panose="020B0502040204020203" pitchFamily="34" charset="0"/>
+            </a:endParaRPr>
+          </a:p>
+          <a:p>
+            <a:r>
+              <a:rPr lang="es-MX" sz="3600" dirty="0" err="1" smtClean="0">
+                <a:latin typeface="Segoe UI" panose="020B0502040204020203" pitchFamily="34" charset="0"/>
+                <a:cs typeface="Segoe UI" panose="020B0502040204020203" pitchFamily="34" charset="0"/>
+                <a:hlinkClick r:id="rId4"/>
+              </a:rPr>
+              <a:t>Griewank</a:t>
+            </a:r>
+            <a:endParaRPr lang="es-MX" sz="3600" dirty="0" smtClean="0">
+              <a:latin typeface="Segoe UI" panose="020B0502040204020203" pitchFamily="34" charset="0"/>
+              <a:cs typeface="Segoe UI" panose="020B0502040204020203" pitchFamily="34" charset="0"/>
+            </a:endParaRPr>
+          </a:p>
+        </p:txBody>
+      </p:sp>
+      <p:sp>
+        <p:nvSpPr>
+          <p:cNvPr id="4" name="Marcador de contenido 2"/>
+          <p:cNvSpPr txBox="1">
+            <a:spLocks/>
+          </p:cNvSpPr>
+          <p:nvPr/>
+        </p:nvSpPr>
+        <p:spPr>
+          <a:xfrm>
+            <a:off x="7446961" y="2428875"/>
+            <a:ext cx="3049590" cy="2343148"/>
+          </a:xfrm>
+          <a:prstGeom prst="rect">
+            <a:avLst/>
+          </a:prstGeom>
+        </p:spPr>
+        <p:txBody>
+          <a:bodyPr vert="horz" lIns="91440" tIns="45720" rIns="91440" bIns="45720" rtlCol="0" anchor="ctr">
+            <a:normAutofit/>
+          </a:bodyPr>
+          <a:lstStyle>
+            <a:lvl1pPr marL="285750" indent="-285750" algn="l" defTabSz="457200" rtl="0" eaLnBrk="1" latinLnBrk="0" hangingPunct="1">
+              <a:spcBef>
+                <a:spcPct val="20000"/>
+              </a:spcBef>
+              <a:spcAft>
+                <a:spcPts val="600"/>
+              </a:spcAft>
+              <a:buClr>
+                <a:schemeClr val="accent1">
+                  <a:lumMod val="75000"/>
+                </a:schemeClr>
+              </a:buClr>
+              <a:buSzPct val="145000"/>
+              <a:buFont typeface="Arial"/>
+              <a:buChar char="•"/>
+              <a:defRPr sz="2400" kern="1200" cap="none">
+                <a:solidFill>
+                  <a:schemeClr val="tx1"/>
+                </a:solidFill>
+                <a:effectLst/>
+                <a:latin typeface="+mn-lt"/>
+                <a:ea typeface="+mn-ea"/>
+                <a:cs typeface="+mn-cs"/>
+              </a:defRPr>
+            </a:lvl1pPr>
+            <a:lvl2pPr marL="742950" indent="-285750" algn="l" defTabSz="457200" rtl="0" eaLnBrk="1" latinLnBrk="0" hangingPunct="1">
+              <a:spcBef>
+                <a:spcPct val="20000"/>
+              </a:spcBef>
+              <a:spcAft>
+                <a:spcPts val="600"/>
+              </a:spcAft>
+              <a:buClr>
+                <a:schemeClr val="accent1">
+                  <a:lumMod val="75000"/>
+                </a:schemeClr>
+              </a:buClr>
+              <a:buSzPct val="145000"/>
+              <a:buFont typeface="Arial"/>
+              <a:buChar char="•"/>
+              <a:defRPr sz="2000" kern="1200" cap="none">
+                <a:solidFill>
+                  <a:schemeClr val="tx1"/>
+                </a:solidFill>
+                <a:effectLst/>
+                <a:latin typeface="+mn-lt"/>
+                <a:ea typeface="+mn-ea"/>
+                <a:cs typeface="+mn-cs"/>
+              </a:defRPr>
+            </a:lvl2pPr>
+            <a:lvl3pPr marL="1200150" indent="-285750" algn="l" defTabSz="457200" rtl="0" eaLnBrk="1" latinLnBrk="0" hangingPunct="1">
+              <a:spcBef>
+                <a:spcPct val="20000"/>
+              </a:spcBef>
+              <a:spcAft>
+                <a:spcPts val="600"/>
+              </a:spcAft>
+              <a:buClr>
+                <a:schemeClr val="accent1">
+                  <a:lumMod val="75000"/>
+                </a:schemeClr>
+              </a:buClr>
+              <a:buSzPct val="145000"/>
+              <a:buFont typeface="Arial"/>
+              <a:buChar char="•"/>
+              <a:defRPr sz="1800" kern="1200" cap="none">
+                <a:solidFill>
+                  <a:schemeClr val="tx1"/>
+                </a:solidFill>
+                <a:effectLst/>
+                <a:latin typeface="+mn-lt"/>
+                <a:ea typeface="+mn-ea"/>
+                <a:cs typeface="+mn-cs"/>
+              </a:defRPr>
+            </a:lvl3pPr>
+            <a:lvl4pPr marL="1543050" indent="-171450" algn="l" defTabSz="457200" rtl="0" eaLnBrk="1" latinLnBrk="0" hangingPunct="1">
+              <a:spcBef>
+                <a:spcPct val="20000"/>
+              </a:spcBef>
+              <a:spcAft>
+                <a:spcPts val="600"/>
+              </a:spcAft>
+              <a:buClr>
+                <a:schemeClr val="accent1">
+                  <a:lumMod val="75000"/>
+                </a:schemeClr>
+              </a:buClr>
+              <a:buSzPct val="145000"/>
+              <a:buFont typeface="Arial"/>
+              <a:buChar char="•"/>
+              <a:defRPr sz="1600" kern="1200" cap="none">
+                <a:solidFill>
+                  <a:schemeClr val="tx1"/>
+                </a:solidFill>
+                <a:effectLst/>
+                <a:latin typeface="+mn-lt"/>
+                <a:ea typeface="+mn-ea"/>
+                <a:cs typeface="+mn-cs"/>
+              </a:defRPr>
+            </a:lvl4pPr>
+            <a:lvl5pPr marL="2000250" indent="-171450" algn="l" defTabSz="457200" rtl="0" eaLnBrk="1" latinLnBrk="0" hangingPunct="1">
+              <a:spcBef>
+                <a:spcPct val="20000"/>
+              </a:spcBef>
+              <a:spcAft>
+                <a:spcPts val="600"/>
+              </a:spcAft>
+              <a:buClr>
+                <a:schemeClr val="accent1">
+                  <a:lumMod val="75000"/>
+                </a:schemeClr>
+              </a:buClr>
+              <a:buSzPct val="145000"/>
+              <a:buFont typeface="Arial"/>
+              <a:buChar char="•"/>
+              <a:defRPr sz="1400" kern="1200" cap="none">
+                <a:solidFill>
+                  <a:schemeClr val="tx1"/>
+                </a:solidFill>
+                <a:effectLst/>
+                <a:latin typeface="+mn-lt"/>
+                <a:ea typeface="+mn-ea"/>
+                <a:cs typeface="+mn-cs"/>
+              </a:defRPr>
+            </a:lvl5pPr>
+            <a:lvl6pPr marL="2514600" indent="-228600" algn="l" defTabSz="457200" rtl="0" eaLnBrk="1" latinLnBrk="0" hangingPunct="1">
+              <a:spcBef>
+                <a:spcPct val="20000"/>
+              </a:spcBef>
+              <a:spcAft>
+                <a:spcPts val="600"/>
+              </a:spcAft>
+              <a:buClr>
+                <a:schemeClr val="accent1">
+                  <a:lumMod val="75000"/>
+                </a:schemeClr>
+              </a:buClr>
+              <a:buSzPct val="145000"/>
+              <a:buFont typeface="Arial"/>
+              <a:buChar char="•"/>
+              <a:defRPr sz="1400" kern="1200" cap="none">
+                <a:solidFill>
+                  <a:schemeClr val="tx1"/>
+                </a:solidFill>
+                <a:effectLst/>
+                <a:latin typeface="+mn-lt"/>
+                <a:ea typeface="+mn-ea"/>
+                <a:cs typeface="+mn-cs"/>
+              </a:defRPr>
+            </a:lvl6pPr>
+            <a:lvl7pPr marL="2971800" indent="-228600" algn="l" defTabSz="457200" rtl="0" eaLnBrk="1" latinLnBrk="0" hangingPunct="1">
+              <a:spcBef>
+                <a:spcPct val="20000"/>
+              </a:spcBef>
+              <a:spcAft>
+                <a:spcPts val="600"/>
+              </a:spcAft>
+              <a:buClr>
+                <a:schemeClr val="accent1">
+                  <a:lumMod val="75000"/>
+                </a:schemeClr>
+              </a:buClr>
+              <a:buSzPct val="145000"/>
+              <a:buFont typeface="Arial"/>
+              <a:buChar char="•"/>
+              <a:defRPr sz="1400" kern="1200" cap="none">
+                <a:solidFill>
+                  <a:schemeClr val="tx1"/>
+                </a:solidFill>
+                <a:effectLst/>
+                <a:latin typeface="+mn-lt"/>
+                <a:ea typeface="+mn-ea"/>
+                <a:cs typeface="+mn-cs"/>
+              </a:defRPr>
+            </a:lvl7pPr>
+            <a:lvl8pPr marL="3429000" indent="-228600" algn="l" defTabSz="457200" rtl="0" eaLnBrk="1" latinLnBrk="0" hangingPunct="1">
+              <a:spcBef>
+                <a:spcPct val="20000"/>
+              </a:spcBef>
+              <a:spcAft>
+                <a:spcPts val="600"/>
+              </a:spcAft>
+              <a:buClr>
+                <a:schemeClr val="accent1">
+                  <a:lumMod val="75000"/>
+                </a:schemeClr>
+              </a:buClr>
+              <a:buSzPct val="145000"/>
+              <a:buFont typeface="Arial"/>
+              <a:buChar char="•"/>
+              <a:defRPr sz="1400" kern="1200" cap="none">
+                <a:solidFill>
+                  <a:schemeClr val="tx1"/>
+                </a:solidFill>
+                <a:effectLst/>
+                <a:latin typeface="+mn-lt"/>
+                <a:ea typeface="+mn-ea"/>
+                <a:cs typeface="+mn-cs"/>
+              </a:defRPr>
+            </a:lvl8pPr>
+            <a:lvl9pPr marL="3886200" indent="-228600" algn="l" defTabSz="457200" rtl="0" eaLnBrk="1" latinLnBrk="0" hangingPunct="1">
+              <a:spcBef>
+                <a:spcPct val="20000"/>
+              </a:spcBef>
+              <a:spcAft>
+                <a:spcPts val="600"/>
+              </a:spcAft>
+              <a:buClr>
+                <a:schemeClr val="accent1">
+                  <a:lumMod val="75000"/>
+                </a:schemeClr>
+              </a:buClr>
+              <a:buSzPct val="145000"/>
+              <a:buFont typeface="Arial"/>
+              <a:buChar char="•"/>
+              <a:defRPr sz="1400" kern="1200" cap="none">
+                <a:solidFill>
+                  <a:schemeClr val="tx1"/>
+                </a:solidFill>
+                <a:effectLst/>
+                <a:latin typeface="+mn-lt"/>
+                <a:ea typeface="+mn-ea"/>
+                <a:cs typeface="+mn-cs"/>
+              </a:defRPr>
+            </a:lvl9pPr>
+          </a:lstStyle>
+          <a:p>
+            <a:r>
+              <a:rPr lang="es-MX" sz="3600" dirty="0" err="1" smtClean="0">
+                <a:latin typeface="Segoe UI" panose="020B0502040204020203" pitchFamily="34" charset="0"/>
+                <a:cs typeface="Segoe UI" panose="020B0502040204020203" pitchFamily="34" charset="0"/>
+                <a:hlinkClick r:id="rId5"/>
+              </a:rPr>
+              <a:t>Branin</a:t>
+            </a:r>
+            <a:endParaRPr lang="es-MX" sz="3600" dirty="0" smtClean="0">
+              <a:latin typeface="Segoe UI" panose="020B0502040204020203" pitchFamily="34" charset="0"/>
+              <a:cs typeface="Segoe UI" panose="020B0502040204020203" pitchFamily="34" charset="0"/>
+            </a:endParaRPr>
+          </a:p>
+          <a:p>
+            <a:r>
+              <a:rPr lang="es-MX" sz="3600" dirty="0" err="1" smtClean="0">
+                <a:latin typeface="Segoe UI" panose="020B0502040204020203" pitchFamily="34" charset="0"/>
+                <a:cs typeface="Segoe UI" panose="020B0502040204020203" pitchFamily="34" charset="0"/>
+                <a:hlinkClick r:id="rId6"/>
+              </a:rPr>
+              <a:t>Easom</a:t>
+            </a:r>
+            <a:endParaRPr lang="es-MX" sz="3600" dirty="0" smtClean="0">
+              <a:latin typeface="Segoe UI" panose="020B0502040204020203" pitchFamily="34" charset="0"/>
+              <a:cs typeface="Segoe UI" panose="020B0502040204020203" pitchFamily="34" charset="0"/>
+            </a:endParaRPr>
+          </a:p>
+          <a:p>
+            <a:r>
+              <a:rPr lang="es-MX" sz="3600" dirty="0" err="1">
+                <a:latin typeface="Segoe UI" panose="020B0502040204020203" pitchFamily="34" charset="0"/>
+                <a:cs typeface="Segoe UI" panose="020B0502040204020203" pitchFamily="34" charset="0"/>
+                <a:hlinkClick r:id="rId7"/>
+              </a:rPr>
+              <a:t>Ackley</a:t>
+            </a:r>
+            <a:endParaRPr lang="es-MX" sz="3600" dirty="0">
+              <a:latin typeface="Segoe UI" panose="020B0502040204020203" pitchFamily="34" charset="0"/>
+              <a:cs typeface="Segoe UI" panose="020B0502040204020203" pitchFamily="34" charset="0"/>
+            </a:endParaRPr>
+          </a:p>
+          <a:p>
+            <a:endParaRPr lang="es-MX" dirty="0"/>
+          </a:p>
+        </p:txBody>
+      </p:sp>
+    </p:spTree>
+    <p:extLst>
+      <p:ext uri="{BB962C8B-B14F-4D97-AF65-F5344CB8AC3E}">
+        <p14:creationId xmlns:p14="http://schemas.microsoft.com/office/powerpoint/2010/main" val="1919679488"/>
       </p:ext>
     </p:extLst>
   </p:cSld>

</xml_diff>